<commit_message>
update slide and added paper
</commit_message>
<xml_diff>
--- a/slide/Advance Algorithms Project.pptx
+++ b/slide/Advance Algorithms Project.pptx
@@ -8014,7 +8014,7 @@
         </p:spPr>
         <p:txBody>
           <a:bodyPr anchorCtr="0" anchor="t" bIns="91425" lIns="91425" spcFirstLastPara="1" rIns="91425" wrap="square" tIns="91425">
-            <a:normAutofit lnSpcReduction="10000"/>
+            <a:normAutofit fontScale="77500" lnSpcReduction="20000"/>
           </a:bodyPr>
           <a:lstStyle/>
           <a:p>
@@ -8037,6 +8037,32 @@
               <a:t>Algorithmic aspect of vertex elimination on graphs</a:t>
             </a:r>
             <a:endParaRPr>
+              <a:latin typeface="Roboto"/>
+              <a:ea typeface="Roboto"/>
+              <a:cs typeface="Roboto"/>
+              <a:sym typeface="Roboto"/>
+            </a:endParaRPr>
+          </a:p>
+          <a:p>
+            <a:pPr indent="0" lvl="0" marL="0" rtl="0" algn="ctr">
+              <a:spcBef>
+                <a:spcPts val="0"/>
+              </a:spcBef>
+              <a:spcAft>
+                <a:spcPts val="0"/>
+              </a:spcAft>
+              <a:buNone/>
+            </a:pPr>
+            <a:r>
+              <a:rPr lang="it" sz="1712">
+                <a:latin typeface="Roboto"/>
+                <a:ea typeface="Roboto"/>
+                <a:cs typeface="Roboto"/>
+                <a:sym typeface="Roboto"/>
+              </a:rPr>
+              <a:t>Donald J. Rose - R. Endre Tarjan</a:t>
+            </a:r>
+            <a:endParaRPr sz="1712">
               <a:latin typeface="Roboto"/>
               <a:ea typeface="Roboto"/>
               <a:cs typeface="Roboto"/>
@@ -11968,7 +11994,7 @@
         </p:nvSpPr>
         <p:spPr>
           <a:xfrm>
-            <a:off x="311700" y="445025"/>
+            <a:off x="311700" y="252475"/>
             <a:ext cx="8520600" cy="572700"/>
           </a:xfrm>
           <a:prstGeom prst="rect">
@@ -11997,7 +12023,7 @@
                 <a:cs typeface="Roboto"/>
                 <a:sym typeface="Roboto"/>
               </a:rPr>
-              <a:t>Code </a:t>
+              <a:t>Code and references</a:t>
             </a:r>
             <a:endParaRPr>
               <a:latin typeface="Roboto"/>
@@ -12018,8 +12044,8 @@
         </p:nvSpPr>
         <p:spPr>
           <a:xfrm>
-            <a:off x="311700" y="1152475"/>
-            <a:ext cx="8520600" cy="3416400"/>
+            <a:off x="311700" y="914550"/>
+            <a:ext cx="8520600" cy="4125900"/>
           </a:xfrm>
           <a:prstGeom prst="rect">
             <a:avLst/>
@@ -12027,7 +12053,7 @@
         </p:spPr>
         <p:txBody>
           <a:bodyPr anchorCtr="0" anchor="t" bIns="91425" lIns="91425" spcFirstLastPara="1" rIns="91425" wrap="square" tIns="91425">
-            <a:normAutofit/>
+            <a:normAutofit lnSpcReduction="10000"/>
           </a:bodyPr>
           <a:lstStyle/>
           <a:p>
@@ -12145,6 +12171,51 @@
             <a:r>
               <a:rPr lang="it"/>
               <a:t>Graph: My implementation </a:t>
+            </a:r>
+            <a:endParaRPr/>
+          </a:p>
+          <a:p>
+            <a:pPr indent="0" lvl="0" marL="914400" rtl="0" algn="l">
+              <a:spcBef>
+                <a:spcPts val="1200"/>
+              </a:spcBef>
+              <a:spcAft>
+                <a:spcPts val="0"/>
+              </a:spcAft>
+              <a:buNone/>
+            </a:pPr>
+            <a:r>
+              <a:t/>
+            </a:r>
+            <a:endParaRPr/>
+          </a:p>
+          <a:p>
+            <a:pPr indent="-342900" lvl="0" marL="457200" rtl="0" algn="l">
+              <a:spcBef>
+                <a:spcPts val="1200"/>
+              </a:spcBef>
+              <a:spcAft>
+                <a:spcPts val="0"/>
+              </a:spcAft>
+              <a:buSzPts val="1800"/>
+              <a:buChar char="●"/>
+            </a:pPr>
+            <a:r>
+              <a:rPr lang="it"/>
+              <a:t>Random graph generation: </a:t>
+            </a:r>
+            <a:r>
+              <a:rPr lang="it" u="sng">
+                <a:solidFill>
+                  <a:schemeClr val="hlink"/>
+                </a:solidFill>
+                <a:hlinkClick r:id="rId4"/>
+              </a:rPr>
+              <a:t>Erdős–Rényi model - Wikipedia</a:t>
+            </a:r>
+            <a:r>
+              <a:rPr lang="it"/>
+              <a:t> , second model</a:t>
             </a:r>
             <a:endParaRPr/>
           </a:p>

</xml_diff>